<commit_message>
Fiz a parte da apresentação com relação ao analisador sintático, se quiserem complementar alguma coisa, ou se quiserem que eu faça mais coisas é só avisar.
</commit_message>
<xml_diff>
--- a/doc/Apresentação do GMAG – Software Básico.pptx
+++ b/doc/Apresentação do GMAG – Software Básico.pptx
@@ -5,7 +5,7 @@
     <p:sldMasterId id="2147483676" r:id="rId1"/>
   </p:sldMasterIdLst>
   <p:notesMasterIdLst>
-    <p:notesMasterId r:id="rId17"/>
+    <p:notesMasterId r:id="rId20"/>
   </p:notesMasterIdLst>
   <p:sldIdLst>
     <p:sldId id="256" r:id="rId2"/>
@@ -23,6 +23,9 @@
     <p:sldId id="270" r:id="rId14"/>
     <p:sldId id="271" r:id="rId15"/>
     <p:sldId id="272" r:id="rId16"/>
+    <p:sldId id="273" r:id="rId17"/>
+    <p:sldId id="274" r:id="rId18"/>
+    <p:sldId id="275" r:id="rId19"/>
   </p:sldIdLst>
   <p:sldSz cx="9144000" cy="6858000" type="screen4x3"/>
   <p:notesSz cx="6858000" cy="9144000"/>
@@ -206,7 +209,8 @@
           <a:p>
             <a:fld id="{0202AF00-0D92-4FB3-BF30-0E1262BA24CF}" type="datetimeFigureOut">
               <a:rPr lang="pt-BR" smtClean="0"/>
-              <a:t>05/11/2011</a:t>
+              <a:pPr/>
+              <a:t>08/11/2011</a:t>
             </a:fld>
             <a:endParaRPr lang="pt-BR"/>
           </a:p>
@@ -367,6 +371,7 @@
           <a:p>
             <a:fld id="{DA376F26-12D3-46DB-BEB2-9E56F06A0510}" type="slidenum">
               <a:rPr lang="pt-BR" smtClean="0"/>
+              <a:pPr/>
               <a:t>‹nº›</a:t>
             </a:fld>
             <a:endParaRPr lang="pt-BR"/>
@@ -546,6 +551,7 @@
           <a:p>
             <a:fld id="{DA376F26-12D3-46DB-BEB2-9E56F06A0510}" type="slidenum">
               <a:rPr lang="pt-BR" smtClean="0"/>
+              <a:pPr/>
               <a:t>11</a:t>
             </a:fld>
             <a:endParaRPr lang="pt-BR"/>
@@ -736,7 +742,7 @@
             <a:fld id="{7BE08B6B-564C-4EB5-BE5C-0142EA1AA5D2}" type="datetimeFigureOut">
               <a:rPr lang="pt-BR" smtClean="0"/>
               <a:pPr/>
-              <a:t>05/11/2011</a:t>
+              <a:t>08/11/2011</a:t>
             </a:fld>
             <a:endParaRPr lang="pt-BR"/>
           </a:p>
@@ -915,7 +921,7 @@
             <a:fld id="{7BE08B6B-564C-4EB5-BE5C-0142EA1AA5D2}" type="datetimeFigureOut">
               <a:rPr lang="pt-BR" smtClean="0"/>
               <a:pPr/>
-              <a:t>05/11/2011</a:t>
+              <a:t>08/11/2011</a:t>
             </a:fld>
             <a:endParaRPr lang="pt-BR"/>
           </a:p>
@@ -1092,7 +1098,7 @@
             <a:fld id="{7BE08B6B-564C-4EB5-BE5C-0142EA1AA5D2}" type="datetimeFigureOut">
               <a:rPr lang="pt-BR" smtClean="0"/>
               <a:pPr/>
-              <a:t>05/11/2011</a:t>
+              <a:t>08/11/2011</a:t>
             </a:fld>
             <a:endParaRPr lang="pt-BR"/>
           </a:p>
@@ -1259,7 +1265,7 @@
             <a:fld id="{7BE08B6B-564C-4EB5-BE5C-0142EA1AA5D2}" type="datetimeFigureOut">
               <a:rPr lang="pt-BR" smtClean="0"/>
               <a:pPr/>
-              <a:t>05/11/2011</a:t>
+              <a:t>08/11/2011</a:t>
             </a:fld>
             <a:endParaRPr lang="pt-BR"/>
           </a:p>
@@ -1502,7 +1508,7 @@
             <a:fld id="{7BE08B6B-564C-4EB5-BE5C-0142EA1AA5D2}" type="datetimeFigureOut">
               <a:rPr lang="pt-BR" smtClean="0"/>
               <a:pPr/>
-              <a:t>05/11/2011</a:t>
+              <a:t>08/11/2011</a:t>
             </a:fld>
             <a:endParaRPr lang="pt-BR"/>
           </a:p>
@@ -1800,7 +1806,7 @@
             <a:fld id="{7BE08B6B-564C-4EB5-BE5C-0142EA1AA5D2}" type="datetimeFigureOut">
               <a:rPr lang="pt-BR" smtClean="0"/>
               <a:pPr/>
-              <a:t>05/11/2011</a:t>
+              <a:t>08/11/2011</a:t>
             </a:fld>
             <a:endParaRPr lang="pt-BR"/>
           </a:p>
@@ -2186,7 +2192,7 @@
             <a:fld id="{7BE08B6B-564C-4EB5-BE5C-0142EA1AA5D2}" type="datetimeFigureOut">
               <a:rPr lang="pt-BR" smtClean="0"/>
               <a:pPr/>
-              <a:t>05/11/2011</a:t>
+              <a:t>08/11/2011</a:t>
             </a:fld>
             <a:endParaRPr lang="pt-BR"/>
           </a:p>
@@ -2361,7 +2367,7 @@
             <a:fld id="{7BE08B6B-564C-4EB5-BE5C-0142EA1AA5D2}" type="datetimeFigureOut">
               <a:rPr lang="pt-BR" smtClean="0"/>
               <a:pPr/>
-              <a:t>05/11/2011</a:t>
+              <a:t>08/11/2011</a:t>
             </a:fld>
             <a:endParaRPr lang="pt-BR"/>
           </a:p>
@@ -2453,7 +2459,7 @@
             <a:fld id="{7BE08B6B-564C-4EB5-BE5C-0142EA1AA5D2}" type="datetimeFigureOut">
               <a:rPr lang="pt-BR" smtClean="0"/>
               <a:pPr/>
-              <a:t>05/11/2011</a:t>
+              <a:t>08/11/2011</a:t>
             </a:fld>
             <a:endParaRPr lang="pt-BR"/>
           </a:p>
@@ -2760,7 +2766,7 @@
             <a:fld id="{7BE08B6B-564C-4EB5-BE5C-0142EA1AA5D2}" type="datetimeFigureOut">
               <a:rPr lang="pt-BR" smtClean="0"/>
               <a:pPr/>
-              <a:t>05/11/2011</a:t>
+              <a:t>08/11/2011</a:t>
             </a:fld>
             <a:endParaRPr lang="pt-BR"/>
           </a:p>
@@ -2896,7 +2902,7 @@
             <a:fld id="{7BE08B6B-564C-4EB5-BE5C-0142EA1AA5D2}" type="datetimeFigureOut">
               <a:rPr lang="pt-BR" smtClean="0"/>
               <a:pPr/>
-              <a:t>05/11/2011</a:t>
+              <a:t>08/11/2011</a:t>
             </a:fld>
             <a:endParaRPr lang="pt-BR"/>
           </a:p>
@@ -3201,7 +3207,7 @@
             <a:fld id="{7BE08B6B-564C-4EB5-BE5C-0142EA1AA5D2}" type="datetimeFigureOut">
               <a:rPr lang="pt-BR" smtClean="0"/>
               <a:pPr/>
-              <a:t>05/11/2011</a:t>
+              <a:t>08/11/2011</a:t>
             </a:fld>
             <a:endParaRPr lang="pt-BR"/>
           </a:p>
@@ -3903,15 +3909,7 @@
             </a:r>
             <a:r>
               <a:rPr lang="pt-BR" dirty="0" smtClean="0"/>
-              <a:t> </a:t>
-            </a:r>
-            <a:r>
-              <a:rPr lang="pt-BR" dirty="0" smtClean="0"/>
-              <a:t>e</a:t>
-            </a:r>
-            <a:r>
-              <a:rPr lang="pt-BR" dirty="0" smtClean="0"/>
-              <a:t> possíveis erros,  definindo-os em valores numéricos para maior comodidade durante as análises.</a:t>
+              <a:t> e possíveis erros,  definindo-os em valores numéricos para maior comodidade durante as análises.</a:t>
             </a:r>
             <a:endParaRPr lang="pt-BR" dirty="0"/>
           </a:p>
@@ -4045,11 +4043,7 @@
           <a:p>
             <a:r>
               <a:rPr lang="pt-BR" dirty="0" smtClean="0"/>
-              <a:t>Alguns exemplos </a:t>
-            </a:r>
-            <a:r>
-              <a:rPr lang="pt-BR" dirty="0" smtClean="0"/>
-              <a:t>estruturas definidas</a:t>
+              <a:t>Alguns exemplos estruturas definidas</a:t>
             </a:r>
             <a:endParaRPr lang="pt-BR" dirty="0"/>
           </a:p>
@@ -4111,29 +4105,121 @@
             </a:r>
             <a:r>
               <a:rPr lang="en-US" dirty="0" smtClean="0"/>
+              <a:t> {</a:t>
+            </a:r>
+          </a:p>
+          <a:p>
+            <a:pPr lvl="1"/>
+            <a:r>
+              <a:rPr lang="en-US" dirty="0" smtClean="0"/>
+              <a:t>	char* symbol;</a:t>
+            </a:r>
+          </a:p>
+          <a:p>
+            <a:pPr lvl="1"/>
+            <a:r>
+              <a:rPr lang="en-US" dirty="0" smtClean="0"/>
+              <a:t>	uint32_t index;</a:t>
+            </a:r>
+          </a:p>
+          <a:p>
+            <a:pPr lvl="1"/>
+            <a:r>
+              <a:rPr lang="en-US" dirty="0" smtClean="0"/>
+              <a:t>	</a:t>
+            </a:r>
+            <a:r>
+              <a:rPr lang="en-US" dirty="0" err="1" smtClean="0"/>
+              <a:t>struct</a:t>
+            </a:r>
+            <a:r>
+              <a:rPr lang="en-US" dirty="0" smtClean="0"/>
               <a:t> </a:t>
             </a:r>
             <a:r>
+              <a:rPr lang="en-US" dirty="0" err="1" smtClean="0"/>
+              <a:t>symbols_table_st</a:t>
+            </a:r>
+            <a:r>
               <a:rPr lang="en-US" dirty="0" smtClean="0"/>
-              <a:t>{</a:t>
+              <a:t> * next;</a:t>
             </a:r>
           </a:p>
           <a:p>
             <a:pPr lvl="1"/>
             <a:r>
               <a:rPr lang="en-US" dirty="0" smtClean="0"/>
-              <a:t>	char* symbol</a:t>
+              <a:t>} </a:t>
+            </a:r>
+            <a:r>
+              <a:rPr lang="en-US" dirty="0" err="1" smtClean="0"/>
+              <a:t>symbols_table</a:t>
             </a:r>
             <a:r>
               <a:rPr lang="en-US" dirty="0" smtClean="0"/>
               <a:t>;</a:t>
             </a:r>
-          </a:p>
-          <a:p>
-            <a:pPr lvl="1"/>
+            <a:r>
+              <a:rPr lang="pt-BR" dirty="0" smtClean="0"/>
+              <a:t>”</a:t>
+            </a:r>
+          </a:p>
+          <a:p>
+            <a:pPr lvl="1"/>
+            <a:endParaRPr lang="pt-BR" dirty="0" smtClean="0"/>
+          </a:p>
+          <a:p>
+            <a:pPr lvl="1"/>
+            <a:r>
+              <a:rPr lang="pt-BR" dirty="0" smtClean="0"/>
+              <a:t>Estrutura de </a:t>
+            </a:r>
+            <a:r>
+              <a:rPr lang="pt-BR" dirty="0" err="1" smtClean="0"/>
+              <a:t>Token</a:t>
+            </a:r>
+            <a:endParaRPr lang="pt-BR" dirty="0" smtClean="0"/>
+          </a:p>
+          <a:p>
+            <a:pPr lvl="1"/>
+            <a:r>
+              <a:rPr lang="pt-BR" dirty="0" smtClean="0"/>
+              <a:t>“</a:t>
+            </a:r>
+            <a:r>
+              <a:rPr lang="en-US" dirty="0" err="1" smtClean="0"/>
+              <a:t>typedef</a:t>
+            </a:r>
             <a:r>
               <a:rPr lang="en-US" dirty="0" smtClean="0"/>
-              <a:t>	uint32_t index</a:t>
+              <a:t> </a:t>
+            </a:r>
+            <a:r>
+              <a:rPr lang="en-US" dirty="0" err="1" smtClean="0"/>
+              <a:t>struct</a:t>
+            </a:r>
+            <a:r>
+              <a:rPr lang="en-US" dirty="0" smtClean="0"/>
+              <a:t> </a:t>
+            </a:r>
+            <a:r>
+              <a:rPr lang="en-US" dirty="0" err="1" smtClean="0"/>
+              <a:t>token_st</a:t>
+            </a:r>
+            <a:r>
+              <a:rPr lang="en-US" dirty="0" smtClean="0"/>
+              <a:t> {</a:t>
+            </a:r>
+          </a:p>
+          <a:p>
+            <a:pPr lvl="1"/>
+            <a:r>
+              <a:rPr lang="en-US" dirty="0" smtClean="0"/>
+              <a:t>    char* </a:t>
+            </a:r>
+            <a:r>
+              <a:rPr lang="en-US" dirty="0" err="1" smtClean="0"/>
+              <a:t>value_s</a:t>
             </a:r>
             <a:r>
               <a:rPr lang="en-US" dirty="0" smtClean="0"/>
@@ -4144,7 +4230,21 @@
             <a:pPr lvl="1"/>
             <a:r>
               <a:rPr lang="en-US" dirty="0" smtClean="0"/>
-              <a:t>	</a:t>
+              <a:t>    int32_t value;</a:t>
+            </a:r>
+          </a:p>
+          <a:p>
+            <a:pPr lvl="1"/>
+            <a:r>
+              <a:rPr lang="en-US" dirty="0" smtClean="0"/>
+              <a:t>    uint8_t type;</a:t>
+            </a:r>
+          </a:p>
+          <a:p>
+            <a:pPr lvl="1"/>
+            <a:r>
+              <a:rPr lang="en-US" dirty="0" smtClean="0"/>
+              <a:t>    </a:t>
             </a:r>
             <a:r>
               <a:rPr lang="en-US" dirty="0" err="1" smtClean="0"/>
@@ -4156,172 +4256,18 @@
             </a:r>
             <a:r>
               <a:rPr lang="en-US" dirty="0" err="1" smtClean="0"/>
-              <a:t>symbols_table_st</a:t>
+              <a:t>token_st</a:t>
             </a:r>
             <a:r>
               <a:rPr lang="en-US" dirty="0" smtClean="0"/>
-              <a:t> * next</a:t>
-            </a:r>
+              <a:t> * next;</a:t>
+            </a:r>
+          </a:p>
+          <a:p>
+            <a:pPr lvl="1"/>
             <a:r>
               <a:rPr lang="en-US" dirty="0" smtClean="0"/>
-              <a:t>;</a:t>
-            </a:r>
-          </a:p>
-          <a:p>
-            <a:pPr lvl="1"/>
-            <a:r>
-              <a:rPr lang="en-US" dirty="0" smtClean="0"/>
-              <a:t>} </a:t>
-            </a:r>
-            <a:r>
-              <a:rPr lang="en-US" dirty="0" err="1" smtClean="0"/>
-              <a:t>symbols_table</a:t>
-            </a:r>
-            <a:r>
-              <a:rPr lang="en-US" dirty="0" smtClean="0"/>
-              <a:t>;</a:t>
-            </a:r>
-            <a:r>
-              <a:rPr lang="pt-BR" dirty="0" smtClean="0"/>
-              <a:t>”</a:t>
-            </a:r>
-          </a:p>
-          <a:p>
-            <a:pPr lvl="1"/>
-            <a:endParaRPr lang="pt-BR" dirty="0" smtClean="0"/>
-          </a:p>
-          <a:p>
-            <a:pPr lvl="1"/>
-            <a:r>
-              <a:rPr lang="pt-BR" dirty="0" smtClean="0"/>
-              <a:t>Estrutura de </a:t>
-            </a:r>
-            <a:r>
-              <a:rPr lang="pt-BR" dirty="0" err="1" smtClean="0"/>
-              <a:t>Token</a:t>
-            </a:r>
-            <a:endParaRPr lang="pt-BR" dirty="0" smtClean="0"/>
-          </a:p>
-          <a:p>
-            <a:pPr lvl="1"/>
-            <a:r>
-              <a:rPr lang="pt-BR" dirty="0" smtClean="0"/>
-              <a:t>“</a:t>
-            </a:r>
-            <a:r>
-              <a:rPr lang="en-US" dirty="0" err="1" smtClean="0"/>
-              <a:t>typedef</a:t>
-            </a:r>
-            <a:r>
-              <a:rPr lang="en-US" dirty="0" smtClean="0"/>
-              <a:t> </a:t>
-            </a:r>
-            <a:r>
-              <a:rPr lang="en-US" dirty="0" err="1" smtClean="0"/>
-              <a:t>struct</a:t>
-            </a:r>
-            <a:r>
-              <a:rPr lang="en-US" dirty="0" smtClean="0"/>
-              <a:t> </a:t>
-            </a:r>
-            <a:r>
-              <a:rPr lang="en-US" dirty="0" err="1" smtClean="0"/>
-              <a:t>token_st</a:t>
-            </a:r>
-            <a:r>
-              <a:rPr lang="en-US" dirty="0" smtClean="0"/>
-              <a:t> </a:t>
-            </a:r>
-            <a:r>
-              <a:rPr lang="en-US" dirty="0" smtClean="0"/>
-              <a:t>{</a:t>
-            </a:r>
-          </a:p>
-          <a:p>
-            <a:pPr lvl="1"/>
-            <a:r>
-              <a:rPr lang="en-US" dirty="0" smtClean="0"/>
-              <a:t>    </a:t>
-            </a:r>
-            <a:r>
-              <a:rPr lang="en-US" dirty="0" smtClean="0"/>
-              <a:t>char* </a:t>
-            </a:r>
-            <a:r>
-              <a:rPr lang="en-US" dirty="0" err="1" smtClean="0"/>
-              <a:t>value_s</a:t>
-            </a:r>
-            <a:r>
-              <a:rPr lang="en-US" dirty="0" smtClean="0"/>
-              <a:t>;</a:t>
-            </a:r>
-          </a:p>
-          <a:p>
-            <a:pPr lvl="1"/>
-            <a:r>
-              <a:rPr lang="en-US" dirty="0" smtClean="0"/>
-              <a:t>    </a:t>
-            </a:r>
-            <a:r>
-              <a:rPr lang="en-US" dirty="0" smtClean="0"/>
-              <a:t>int32_t value</a:t>
-            </a:r>
-            <a:r>
-              <a:rPr lang="en-US" dirty="0" smtClean="0"/>
-              <a:t>;</a:t>
-            </a:r>
-          </a:p>
-          <a:p>
-            <a:pPr lvl="1"/>
-            <a:r>
-              <a:rPr lang="en-US" dirty="0" smtClean="0"/>
-              <a:t>    </a:t>
-            </a:r>
-            <a:r>
-              <a:rPr lang="en-US" dirty="0" smtClean="0"/>
-              <a:t>uint8_t </a:t>
-            </a:r>
-            <a:r>
-              <a:rPr lang="en-US" dirty="0" smtClean="0"/>
-              <a:t>type;</a:t>
-            </a:r>
-          </a:p>
-          <a:p>
-            <a:pPr lvl="1"/>
-            <a:r>
-              <a:rPr lang="en-US" dirty="0" smtClean="0"/>
-              <a:t>    </a:t>
-            </a:r>
-            <a:r>
-              <a:rPr lang="en-US" dirty="0" err="1" smtClean="0"/>
-              <a:t>struct</a:t>
-            </a:r>
-            <a:r>
-              <a:rPr lang="en-US" dirty="0" smtClean="0"/>
-              <a:t> </a:t>
-            </a:r>
-            <a:r>
-              <a:rPr lang="en-US" dirty="0" err="1" smtClean="0"/>
-              <a:t>token_st</a:t>
-            </a:r>
-            <a:r>
-              <a:rPr lang="en-US" dirty="0" smtClean="0"/>
-              <a:t> * next</a:t>
-            </a:r>
-            <a:r>
-              <a:rPr lang="en-US" dirty="0" smtClean="0"/>
-              <a:t>;</a:t>
-            </a:r>
-          </a:p>
-          <a:p>
-            <a:pPr lvl="1"/>
-            <a:r>
-              <a:rPr lang="en-US" dirty="0" smtClean="0"/>
-              <a:t>} </a:t>
-            </a:r>
-            <a:r>
-              <a:rPr lang="en-US" dirty="0" smtClean="0"/>
-              <a:t>token;</a:t>
+              <a:t>} token;</a:t>
             </a:r>
             <a:r>
               <a:rPr lang="pt-BR" dirty="0" smtClean="0"/>
@@ -4437,26 +4383,87 @@
             </a:r>
             <a:r>
               <a:rPr lang="pt-BR" dirty="0" smtClean="0"/>
+              <a:t> {</a:t>
+            </a:r>
+          </a:p>
+          <a:p>
+            <a:pPr lvl="1"/>
+            <a:r>
+              <a:rPr lang="pt-BR" dirty="0" smtClean="0"/>
+              <a:t>    uint32_t </a:t>
+            </a:r>
+            <a:r>
+              <a:rPr lang="pt-BR" dirty="0" err="1" smtClean="0"/>
+              <a:t>index</a:t>
+            </a:r>
+            <a:r>
+              <a:rPr lang="pt-BR" dirty="0" smtClean="0"/>
+              <a:t>;</a:t>
+            </a:r>
+          </a:p>
+          <a:p>
+            <a:pPr lvl="1"/>
+            <a:r>
+              <a:rPr lang="pt-BR" dirty="0" smtClean="0"/>
+              <a:t>	uint32_t </a:t>
+            </a:r>
+            <a:r>
+              <a:rPr lang="pt-BR" dirty="0" err="1" smtClean="0"/>
+              <a:t>code_line</a:t>
+            </a:r>
+            <a:r>
+              <a:rPr lang="pt-BR" dirty="0" smtClean="0"/>
+              <a:t>;</a:t>
+            </a:r>
+          </a:p>
+          <a:p>
+            <a:pPr lvl="1"/>
+            <a:r>
+              <a:rPr lang="pt-BR" dirty="0" smtClean="0"/>
+              <a:t>    </a:t>
+            </a:r>
+            <a:r>
+              <a:rPr lang="pt-BR" dirty="0" err="1" smtClean="0"/>
+              <a:t>token</a:t>
+            </a:r>
+            <a:r>
+              <a:rPr lang="pt-BR" dirty="0" smtClean="0"/>
+              <a:t>* </a:t>
+            </a:r>
+            <a:r>
+              <a:rPr lang="pt-BR" dirty="0" err="1" smtClean="0"/>
+              <a:t>first_token</a:t>
+            </a:r>
+            <a:r>
+              <a:rPr lang="pt-BR" dirty="0" smtClean="0"/>
+              <a:t>;</a:t>
+            </a:r>
+          </a:p>
+          <a:p>
+            <a:pPr lvl="1"/>
+            <a:r>
+              <a:rPr lang="pt-BR" dirty="0" smtClean="0"/>
+              <a:t>    </a:t>
+            </a:r>
+            <a:r>
+              <a:rPr lang="pt-BR" dirty="0" err="1" smtClean="0"/>
+              <a:t>struct</a:t>
+            </a:r>
+            <a:r>
+              <a:rPr lang="pt-BR" dirty="0" smtClean="0"/>
               <a:t> </a:t>
             </a:r>
             <a:r>
-              <a:rPr lang="pt-BR" dirty="0" smtClean="0"/>
-              <a:t>{</a:t>
-            </a:r>
-          </a:p>
-          <a:p>
-            <a:pPr lvl="1"/>
-            <a:r>
-              <a:rPr lang="pt-BR" dirty="0" smtClean="0"/>
-              <a:t>    </a:t>
-            </a:r>
-            <a:r>
-              <a:rPr lang="pt-BR" dirty="0" smtClean="0"/>
-              <a:t>uint32_t </a:t>
-            </a:r>
-            <a:r>
-              <a:rPr lang="pt-BR" dirty="0" err="1" smtClean="0"/>
-              <a:t>index</a:t>
+              <a:rPr lang="pt-BR" dirty="0" err="1" smtClean="0"/>
+              <a:t>token_list_st</a:t>
+            </a:r>
+            <a:r>
+              <a:rPr lang="pt-BR" dirty="0" smtClean="0"/>
+              <a:t> * </a:t>
+            </a:r>
+            <a:r>
+              <a:rPr lang="pt-BR" dirty="0" err="1" smtClean="0"/>
+              <a:t>next</a:t>
             </a:r>
             <a:r>
               <a:rPr lang="pt-BR" dirty="0" smtClean="0"/>
@@ -4467,11 +4474,60 @@
             <a:pPr lvl="1"/>
             <a:r>
               <a:rPr lang="pt-BR" dirty="0" smtClean="0"/>
-              <a:t>	uint32_t </a:t>
-            </a:r>
-            <a:r>
-              <a:rPr lang="pt-BR" dirty="0" err="1" smtClean="0"/>
-              <a:t>code_line</a:t>
+              <a:t>} </a:t>
+            </a:r>
+            <a:r>
+              <a:rPr lang="pt-BR" dirty="0" err="1" smtClean="0"/>
+              <a:t>token_list</a:t>
+            </a:r>
+            <a:r>
+              <a:rPr lang="pt-BR" dirty="0" smtClean="0"/>
+              <a:t>;”</a:t>
+            </a:r>
+          </a:p>
+          <a:p>
+            <a:pPr lvl="1"/>
+            <a:endParaRPr lang="pt-BR" dirty="0" smtClean="0"/>
+          </a:p>
+          <a:p>
+            <a:pPr lvl="1"/>
+            <a:r>
+              <a:rPr lang="pt-BR" dirty="0" smtClean="0"/>
+              <a:t>Estrutura de Instruções</a:t>
+            </a:r>
+          </a:p>
+          <a:p>
+            <a:pPr lvl="1"/>
+            <a:r>
+              <a:rPr lang="pt-BR" dirty="0" smtClean="0"/>
+              <a:t>“</a:t>
+            </a:r>
+            <a:r>
+              <a:rPr lang="pt-BR" dirty="0" err="1" smtClean="0"/>
+              <a:t>typedef</a:t>
+            </a:r>
+            <a:r>
+              <a:rPr lang="pt-BR" dirty="0" smtClean="0"/>
+              <a:t> </a:t>
+            </a:r>
+            <a:r>
+              <a:rPr lang="pt-BR" dirty="0" err="1" smtClean="0"/>
+              <a:t>struct</a:t>
+            </a:r>
+            <a:r>
+              <a:rPr lang="pt-BR" dirty="0" smtClean="0"/>
+              <a:t> {</a:t>
+            </a:r>
+          </a:p>
+          <a:p>
+            <a:pPr lvl="1"/>
+            <a:r>
+              <a:rPr lang="pt-BR" dirty="0" smtClean="0"/>
+              <a:t>    uint8_t </a:t>
+            </a:r>
+            <a:r>
+              <a:rPr lang="pt-BR" dirty="0" err="1" smtClean="0"/>
+              <a:t>op</a:t>
             </a:r>
             <a:r>
               <a:rPr lang="pt-BR" dirty="0" smtClean="0"/>
@@ -4482,19 +4538,11 @@
             <a:pPr lvl="1"/>
             <a:r>
               <a:rPr lang="pt-BR" dirty="0" smtClean="0"/>
-              <a:t>    </a:t>
-            </a:r>
-            <a:r>
-              <a:rPr lang="pt-BR" dirty="0" err="1" smtClean="0"/>
-              <a:t>token</a:t>
-            </a:r>
-            <a:r>
-              <a:rPr lang="pt-BR" dirty="0" smtClean="0"/>
-              <a:t>* </a:t>
-            </a:r>
-            <a:r>
-              <a:rPr lang="pt-BR" dirty="0" err="1" smtClean="0"/>
-              <a:t>first_token</a:t>
+              <a:t>    uint8_t </a:t>
+            </a:r>
+            <a:r>
+              <a:rPr lang="pt-BR" dirty="0" err="1" smtClean="0"/>
+              <a:t>rs</a:t>
             </a:r>
             <a:r>
               <a:rPr lang="pt-BR" dirty="0" smtClean="0"/>
@@ -4505,27 +4553,11 @@
             <a:pPr lvl="1"/>
             <a:r>
               <a:rPr lang="pt-BR" dirty="0" smtClean="0"/>
-              <a:t>    </a:t>
-            </a:r>
-            <a:r>
-              <a:rPr lang="pt-BR" dirty="0" err="1" smtClean="0"/>
-              <a:t>struct</a:t>
-            </a:r>
-            <a:r>
-              <a:rPr lang="pt-BR" dirty="0" smtClean="0"/>
-              <a:t> </a:t>
-            </a:r>
-            <a:r>
-              <a:rPr lang="pt-BR" dirty="0" err="1" smtClean="0"/>
-              <a:t>token_list_st</a:t>
-            </a:r>
-            <a:r>
-              <a:rPr lang="pt-BR" dirty="0" smtClean="0"/>
-              <a:t> * </a:t>
-            </a:r>
-            <a:r>
-              <a:rPr lang="pt-BR" dirty="0" err="1" smtClean="0"/>
-              <a:t>next</a:t>
+              <a:t>    uint8_t </a:t>
+            </a:r>
+            <a:r>
+              <a:rPr lang="pt-BR" dirty="0" err="1" smtClean="0"/>
+              <a:t>rt</a:t>
             </a:r>
             <a:r>
               <a:rPr lang="pt-BR" dirty="0" smtClean="0"/>
@@ -4536,69 +4568,11 @@
             <a:pPr lvl="1"/>
             <a:r>
               <a:rPr lang="pt-BR" dirty="0" smtClean="0"/>
-              <a:t>} </a:t>
-            </a:r>
-            <a:r>
-              <a:rPr lang="pt-BR" dirty="0" err="1" smtClean="0"/>
-              <a:t>token_list</a:t>
-            </a:r>
-            <a:r>
-              <a:rPr lang="pt-BR" dirty="0" smtClean="0"/>
-              <a:t>;”</a:t>
-            </a:r>
-          </a:p>
-          <a:p>
-            <a:pPr lvl="1"/>
-            <a:endParaRPr lang="pt-BR" dirty="0" smtClean="0"/>
-          </a:p>
-          <a:p>
-            <a:pPr lvl="1"/>
-            <a:r>
-              <a:rPr lang="pt-BR" dirty="0" smtClean="0"/>
-              <a:t>Estrutura de Instruções</a:t>
-            </a:r>
-            <a:endParaRPr lang="pt-BR" dirty="0" smtClean="0"/>
-          </a:p>
-          <a:p>
-            <a:pPr lvl="1"/>
-            <a:r>
-              <a:rPr lang="pt-BR" dirty="0" smtClean="0"/>
-              <a:t>“</a:t>
-            </a:r>
-            <a:r>
-              <a:rPr lang="pt-BR" dirty="0" err="1" smtClean="0"/>
-              <a:t>typedef</a:t>
-            </a:r>
-            <a:r>
-              <a:rPr lang="pt-BR" dirty="0" smtClean="0"/>
-              <a:t> </a:t>
-            </a:r>
-            <a:r>
-              <a:rPr lang="pt-BR" dirty="0" err="1" smtClean="0"/>
-              <a:t>struct</a:t>
-            </a:r>
-            <a:r>
-              <a:rPr lang="pt-BR" dirty="0" smtClean="0"/>
-              <a:t> </a:t>
-            </a:r>
-            <a:r>
-              <a:rPr lang="pt-BR" dirty="0" smtClean="0"/>
-              <a:t>{</a:t>
-            </a:r>
-          </a:p>
-          <a:p>
-            <a:pPr lvl="1"/>
-            <a:r>
-              <a:rPr lang="pt-BR" dirty="0" smtClean="0"/>
-              <a:t>    </a:t>
-            </a:r>
-            <a:r>
-              <a:rPr lang="pt-BR" dirty="0" smtClean="0"/>
-              <a:t>uint8_t </a:t>
-            </a:r>
-            <a:r>
-              <a:rPr lang="pt-BR" dirty="0" err="1" smtClean="0"/>
-              <a:t>op</a:t>
+              <a:t>    uint8_t </a:t>
+            </a:r>
+            <a:r>
+              <a:rPr lang="pt-BR" dirty="0" err="1" smtClean="0"/>
+              <a:t>rd</a:t>
             </a:r>
             <a:r>
               <a:rPr lang="pt-BR" dirty="0" smtClean="0"/>
@@ -4609,15 +4583,11 @@
             <a:pPr lvl="1"/>
             <a:r>
               <a:rPr lang="pt-BR" dirty="0" smtClean="0"/>
-              <a:t>    </a:t>
-            </a:r>
-            <a:r>
-              <a:rPr lang="pt-BR" dirty="0" smtClean="0"/>
-              <a:t>uint8_t </a:t>
-            </a:r>
-            <a:r>
-              <a:rPr lang="pt-BR" dirty="0" err="1" smtClean="0"/>
-              <a:t>rs</a:t>
+              <a:t>    uint8_t </a:t>
+            </a:r>
+            <a:r>
+              <a:rPr lang="pt-BR" dirty="0" err="1" smtClean="0"/>
+              <a:t>funct</a:t>
             </a:r>
             <a:r>
               <a:rPr lang="pt-BR" dirty="0" smtClean="0"/>
@@ -4628,68 +4598,7 @@
             <a:pPr lvl="1"/>
             <a:r>
               <a:rPr lang="pt-BR" dirty="0" smtClean="0"/>
-              <a:t>    </a:t>
-            </a:r>
-            <a:r>
-              <a:rPr lang="pt-BR" dirty="0" smtClean="0"/>
-              <a:t>uint8_t </a:t>
-            </a:r>
-            <a:r>
-              <a:rPr lang="pt-BR" dirty="0" err="1" smtClean="0"/>
-              <a:t>rt</a:t>
-            </a:r>
-            <a:r>
-              <a:rPr lang="pt-BR" dirty="0" smtClean="0"/>
-              <a:t>;</a:t>
-            </a:r>
-          </a:p>
-          <a:p>
-            <a:pPr lvl="1"/>
-            <a:r>
-              <a:rPr lang="pt-BR" dirty="0" smtClean="0"/>
-              <a:t>    </a:t>
-            </a:r>
-            <a:r>
-              <a:rPr lang="pt-BR" dirty="0" smtClean="0"/>
-              <a:t>uint8_t </a:t>
-            </a:r>
-            <a:r>
-              <a:rPr lang="pt-BR" dirty="0" err="1" smtClean="0"/>
-              <a:t>rd</a:t>
-            </a:r>
-            <a:r>
-              <a:rPr lang="pt-BR" dirty="0" smtClean="0"/>
-              <a:t>;</a:t>
-            </a:r>
-          </a:p>
-          <a:p>
-            <a:pPr lvl="1"/>
-            <a:r>
-              <a:rPr lang="pt-BR" dirty="0" smtClean="0"/>
-              <a:t>    </a:t>
-            </a:r>
-            <a:r>
-              <a:rPr lang="pt-BR" dirty="0" smtClean="0"/>
-              <a:t>uint8_t </a:t>
-            </a:r>
-            <a:r>
-              <a:rPr lang="pt-BR" dirty="0" err="1" smtClean="0"/>
-              <a:t>funct</a:t>
-            </a:r>
-            <a:r>
-              <a:rPr lang="pt-BR" dirty="0" smtClean="0"/>
-              <a:t>;</a:t>
-            </a:r>
-          </a:p>
-          <a:p>
-            <a:pPr lvl="1"/>
-            <a:r>
-              <a:rPr lang="pt-BR" dirty="0" smtClean="0"/>
-              <a:t>    </a:t>
-            </a:r>
-            <a:r>
-              <a:rPr lang="pt-BR" dirty="0" smtClean="0"/>
-              <a:t>int32_t </a:t>
+              <a:t>    int32_t </a:t>
             </a:r>
             <a:r>
               <a:rPr lang="pt-BR" dirty="0" err="1" smtClean="0"/>
@@ -4785,11 +4694,7 @@
           <a:p>
             <a:r>
               <a:rPr lang="pt-BR" dirty="0" smtClean="0"/>
-              <a:t>Alguns exemplos estruturas </a:t>
-            </a:r>
-            <a:r>
-              <a:rPr lang="pt-BR" dirty="0" smtClean="0"/>
-              <a:t>definidas e funções para depuração</a:t>
+              <a:t>Alguns exemplos estruturas definidas e funções para depuração</a:t>
             </a:r>
             <a:endParaRPr lang="pt-BR" dirty="0"/>
           </a:p>
@@ -4851,11 +4756,28 @@
             </a:r>
             <a:r>
               <a:rPr lang="en-US" dirty="0" smtClean="0"/>
-              <a:t> </a:t>
-            </a:r>
+              <a:t> {</a:t>
+            </a:r>
+          </a:p>
+          <a:p>
+            <a:pPr lvl="1"/>
             <a:r>
               <a:rPr lang="en-US" dirty="0" smtClean="0"/>
-              <a:t>{</a:t>
+              <a:t>    uint32_t index;</a:t>
+            </a:r>
+          </a:p>
+          <a:p>
+            <a:pPr lvl="1"/>
+            <a:r>
+              <a:rPr lang="en-US" dirty="0" smtClean="0"/>
+              <a:t>    uint8_t type;</a:t>
+            </a:r>
+          </a:p>
+          <a:p>
+            <a:pPr lvl="1"/>
+            <a:r>
+              <a:rPr lang="en-US" dirty="0" smtClean="0"/>
+              <a:t>    inst values;</a:t>
             </a:r>
           </a:p>
           <a:p>
@@ -4865,85 +4787,36 @@
               <a:t>    </a:t>
             </a:r>
             <a:r>
+              <a:rPr lang="en-US" dirty="0" err="1" smtClean="0"/>
+              <a:t>struct</a:t>
+            </a:r>
+            <a:r>
               <a:rPr lang="en-US" dirty="0" smtClean="0"/>
-              <a:t>uint32_t index</a:t>
+              <a:t> </a:t>
+            </a:r>
+            <a:r>
+              <a:rPr lang="en-US" dirty="0" err="1" smtClean="0"/>
+              <a:t>inst_list_st</a:t>
+            </a:r>
+            <a:r>
+              <a:rPr lang="en-US" dirty="0" smtClean="0"/>
+              <a:t> *next;</a:t>
+            </a:r>
+          </a:p>
+          <a:p>
+            <a:pPr lvl="1"/>
+            <a:r>
+              <a:rPr lang="en-US" dirty="0" smtClean="0"/>
+              <a:t>} </a:t>
+            </a:r>
+            <a:r>
+              <a:rPr lang="en-US" dirty="0" err="1" smtClean="0"/>
+              <a:t>inst_list</a:t>
             </a:r>
             <a:r>
               <a:rPr lang="en-US" dirty="0" smtClean="0"/>
               <a:t>;</a:t>
             </a:r>
-          </a:p>
-          <a:p>
-            <a:pPr lvl="1"/>
-            <a:r>
-              <a:rPr lang="en-US" dirty="0" smtClean="0"/>
-              <a:t>    </a:t>
-            </a:r>
-            <a:r>
-              <a:rPr lang="en-US" dirty="0" smtClean="0"/>
-              <a:t>uint8_t type</a:t>
-            </a:r>
-            <a:r>
-              <a:rPr lang="en-US" dirty="0" smtClean="0"/>
-              <a:t>;</a:t>
-            </a:r>
-          </a:p>
-          <a:p>
-            <a:pPr lvl="1"/>
-            <a:r>
-              <a:rPr lang="en-US" dirty="0" smtClean="0"/>
-              <a:t>    </a:t>
-            </a:r>
-            <a:r>
-              <a:rPr lang="en-US" dirty="0" smtClean="0"/>
-              <a:t>inst values</a:t>
-            </a:r>
-            <a:r>
-              <a:rPr lang="en-US" dirty="0" smtClean="0"/>
-              <a:t>;</a:t>
-            </a:r>
-          </a:p>
-          <a:p>
-            <a:pPr lvl="1"/>
-            <a:r>
-              <a:rPr lang="en-US" dirty="0" smtClean="0"/>
-              <a:t>    </a:t>
-            </a:r>
-            <a:r>
-              <a:rPr lang="en-US" dirty="0" err="1" smtClean="0"/>
-              <a:t>struct</a:t>
-            </a:r>
-            <a:r>
-              <a:rPr lang="en-US" dirty="0" smtClean="0"/>
-              <a:t> </a:t>
-            </a:r>
-            <a:r>
-              <a:rPr lang="en-US" dirty="0" err="1" smtClean="0"/>
-              <a:t>inst_list_st</a:t>
-            </a:r>
-            <a:r>
-              <a:rPr lang="en-US" dirty="0" smtClean="0"/>
-              <a:t> *next</a:t>
-            </a:r>
-            <a:r>
-              <a:rPr lang="en-US" dirty="0" smtClean="0"/>
-              <a:t>;</a:t>
-            </a:r>
-          </a:p>
-          <a:p>
-            <a:pPr lvl="1"/>
-            <a:r>
-              <a:rPr lang="en-US" dirty="0" smtClean="0"/>
-              <a:t>} </a:t>
-            </a:r>
-            <a:r>
-              <a:rPr lang="en-US" dirty="0" err="1" smtClean="0"/>
-              <a:t>inst_list</a:t>
-            </a:r>
-            <a:r>
-              <a:rPr lang="en-US" dirty="0" smtClean="0"/>
-              <a:t>;</a:t>
-            </a:r>
             <a:r>
               <a:rPr lang="pt-BR" dirty="0" smtClean="0"/>
               <a:t>” </a:t>
@@ -4959,7 +4832,6 @@
               <a:rPr lang="pt-BR" dirty="0" smtClean="0"/>
               <a:t>Funções para Depuração do código</a:t>
             </a:r>
-            <a:endParaRPr lang="pt-BR" dirty="0" smtClean="0"/>
           </a:p>
           <a:p>
             <a:pPr lvl="1"/>
@@ -5222,6 +5094,363 @@
           <a:lstStyle/>
           <a:p>
             <a:endParaRPr lang="pt-BR"/>
+          </a:p>
+        </p:txBody>
+      </p:sp>
+    </p:spTree>
+  </p:cSld>
+  <p:clrMapOvr>
+    <a:masterClrMapping/>
+  </p:clrMapOvr>
+</p:sld>
+</file>
+
+<file path=ppt/slides/slide16.xml><?xml version="1.0" encoding="utf-8"?>
+<p:sld xmlns:a="http://schemas.openxmlformats.org/drawingml/2006/main" xmlns:r="http://schemas.openxmlformats.org/officeDocument/2006/relationships" xmlns:p="http://schemas.openxmlformats.org/presentationml/2006/main">
+  <p:cSld>
+    <p:spTree>
+      <p:nvGrpSpPr>
+        <p:cNvPr id="1" name=""/>
+        <p:cNvGrpSpPr/>
+        <p:nvPr/>
+      </p:nvGrpSpPr>
+      <p:grpSpPr>
+        <a:xfrm>
+          <a:off x="0" y="0"/>
+          <a:ext cx="0" cy="0"/>
+          <a:chOff x="0" y="0"/>
+          <a:chExt cx="0" cy="0"/>
+        </a:xfrm>
+      </p:grpSpPr>
+      <p:sp>
+        <p:nvSpPr>
+          <p:cNvPr id="2" name="Título 1"/>
+          <p:cNvSpPr>
+            <a:spLocks noGrp="1"/>
+          </p:cNvSpPr>
+          <p:nvPr>
+            <p:ph type="title"/>
+          </p:nvPr>
+        </p:nvSpPr>
+        <p:spPr/>
+        <p:txBody>
+          <a:bodyPr/>
+          <a:lstStyle/>
+          <a:p>
+            <a:r>
+              <a:rPr lang="pt-BR" dirty="0" smtClean="0"/>
+              <a:t>Analisador </a:t>
+            </a:r>
+            <a:r>
+              <a:rPr lang="pt-BR" dirty="0" err="1" smtClean="0"/>
+              <a:t>Sinatático</a:t>
+            </a:r>
+            <a:endParaRPr lang="pt-BR" dirty="0"/>
+          </a:p>
+        </p:txBody>
+      </p:sp>
+      <p:sp>
+        <p:nvSpPr>
+          <p:cNvPr id="3" name="Espaço Reservado para Conteúdo 2"/>
+          <p:cNvSpPr>
+            <a:spLocks noGrp="1"/>
+          </p:cNvSpPr>
+          <p:nvPr>
+            <p:ph idx="1"/>
+          </p:nvPr>
+        </p:nvSpPr>
+        <p:spPr/>
+        <p:txBody>
+          <a:bodyPr>
+            <a:normAutofit lnSpcReduction="10000"/>
+          </a:bodyPr>
+          <a:lstStyle/>
+          <a:p>
+            <a:r>
+              <a:rPr lang="pt-BR" dirty="0" smtClean="0"/>
+              <a:t>Tem como variáveis de entrada a saída do analisador léxico:</a:t>
+            </a:r>
+          </a:p>
+          <a:p>
+            <a:pPr lvl="1"/>
+            <a:r>
+              <a:rPr lang="pt-BR" dirty="0" err="1" smtClean="0"/>
+              <a:t>token_list</a:t>
+            </a:r>
+            <a:r>
+              <a:rPr lang="pt-BR" dirty="0" smtClean="0"/>
+              <a:t> que é uma lista de </a:t>
+            </a:r>
+            <a:r>
+              <a:rPr lang="pt-BR" dirty="0" err="1" smtClean="0"/>
+              <a:t>structs</a:t>
+            </a:r>
+            <a:r>
+              <a:rPr lang="pt-BR" dirty="0" smtClean="0"/>
+              <a:t> composta por </a:t>
+            </a:r>
+            <a:r>
+              <a:rPr lang="pt-BR" dirty="0" err="1" smtClean="0"/>
+              <a:t>structs</a:t>
+            </a:r>
+            <a:r>
+              <a:rPr lang="pt-BR" dirty="0" smtClean="0"/>
+              <a:t> de </a:t>
+            </a:r>
+            <a:r>
+              <a:rPr lang="pt-BR" dirty="0" err="1" smtClean="0"/>
+              <a:t>tokens</a:t>
+            </a:r>
+            <a:r>
+              <a:rPr lang="pt-BR" dirty="0" smtClean="0"/>
+              <a:t>;</a:t>
+            </a:r>
+          </a:p>
+          <a:p>
+            <a:endParaRPr lang="pt-BR" dirty="0" smtClean="0"/>
+          </a:p>
+          <a:p>
+            <a:r>
+              <a:rPr lang="pt-BR" dirty="0" smtClean="0"/>
+              <a:t>A para cada instrução são feitas checagens de:</a:t>
+            </a:r>
+          </a:p>
+          <a:p>
+            <a:pPr lvl="1"/>
+            <a:r>
+              <a:rPr lang="pt-BR" dirty="0" err="1" smtClean="0"/>
+              <a:t>Label</a:t>
+            </a:r>
+            <a:r>
+              <a:rPr lang="pt-BR" dirty="0" smtClean="0"/>
+              <a:t> repetida;</a:t>
+            </a:r>
+          </a:p>
+          <a:p>
+            <a:pPr lvl="1"/>
+            <a:r>
+              <a:rPr lang="pt-BR" dirty="0" smtClean="0"/>
+              <a:t>Correta padronização das instruções (checando com a gramática;</a:t>
+            </a:r>
+          </a:p>
+          <a:p>
+            <a:pPr lvl="1"/>
+            <a:endParaRPr lang="pt-BR" dirty="0" smtClean="0"/>
+          </a:p>
+        </p:txBody>
+      </p:sp>
+    </p:spTree>
+  </p:cSld>
+  <p:clrMapOvr>
+    <a:masterClrMapping/>
+  </p:clrMapOvr>
+</p:sld>
+</file>
+
+<file path=ppt/slides/slide17.xml><?xml version="1.0" encoding="utf-8"?>
+<p:sld xmlns:a="http://schemas.openxmlformats.org/drawingml/2006/main" xmlns:r="http://schemas.openxmlformats.org/officeDocument/2006/relationships" xmlns:p="http://schemas.openxmlformats.org/presentationml/2006/main">
+  <p:cSld>
+    <p:spTree>
+      <p:nvGrpSpPr>
+        <p:cNvPr id="1" name=""/>
+        <p:cNvGrpSpPr/>
+        <p:nvPr/>
+      </p:nvGrpSpPr>
+      <p:grpSpPr>
+        <a:xfrm>
+          <a:off x="0" y="0"/>
+          <a:ext cx="0" cy="0"/>
+          <a:chOff x="0" y="0"/>
+          <a:chExt cx="0" cy="0"/>
+        </a:xfrm>
+      </p:grpSpPr>
+      <p:sp>
+        <p:nvSpPr>
+          <p:cNvPr id="2" name="Título 1"/>
+          <p:cNvSpPr>
+            <a:spLocks noGrp="1"/>
+          </p:cNvSpPr>
+          <p:nvPr>
+            <p:ph type="title"/>
+          </p:nvPr>
+        </p:nvSpPr>
+        <p:spPr/>
+        <p:txBody>
+          <a:bodyPr>
+            <a:normAutofit/>
+          </a:bodyPr>
+          <a:lstStyle/>
+          <a:p>
+            <a:r>
+              <a:rPr lang="pt-BR" dirty="0" smtClean="0"/>
+              <a:t>Analisador Sintático</a:t>
+            </a:r>
+            <a:endParaRPr lang="pt-BR" dirty="0"/>
+          </a:p>
+        </p:txBody>
+      </p:sp>
+      <p:sp>
+        <p:nvSpPr>
+          <p:cNvPr id="3" name="Espaço Reservado para Conteúdo 2"/>
+          <p:cNvSpPr>
+            <a:spLocks noGrp="1"/>
+          </p:cNvSpPr>
+          <p:nvPr>
+            <p:ph idx="1"/>
+          </p:nvPr>
+        </p:nvSpPr>
+        <p:spPr/>
+        <p:txBody>
+          <a:bodyPr>
+            <a:normAutofit/>
+          </a:bodyPr>
+          <a:lstStyle/>
+          <a:p>
+            <a:r>
+              <a:rPr lang="pt-BR" dirty="0" smtClean="0"/>
+              <a:t>Em seguida é feito uma análise dos registradores:</a:t>
+            </a:r>
+          </a:p>
+          <a:p>
+            <a:pPr lvl="1"/>
+            <a:r>
+              <a:rPr lang="pt-BR" dirty="0" smtClean="0"/>
+              <a:t>É verificado a quantidade de registradores na instrução;</a:t>
+            </a:r>
+          </a:p>
+          <a:p>
+            <a:pPr lvl="1"/>
+            <a:r>
+              <a:rPr lang="pt-BR" dirty="0" smtClean="0"/>
+              <a:t>Se os registradores estão no formato certo;</a:t>
+            </a:r>
+          </a:p>
+          <a:p>
+            <a:pPr lvl="1"/>
+            <a:r>
+              <a:rPr lang="pt-BR" dirty="0" smtClean="0"/>
+              <a:t>Se estão escritos da forma correta, ex: tem virgulas, colchetes;</a:t>
+            </a:r>
+          </a:p>
+          <a:p>
+            <a:pPr lvl="1"/>
+            <a:r>
+              <a:rPr lang="pt-BR" dirty="0" smtClean="0"/>
+              <a:t>Se os formatos encontrados estão de acordo com o formato esperado de cada instrução;</a:t>
+            </a:r>
+          </a:p>
+        </p:txBody>
+      </p:sp>
+    </p:spTree>
+  </p:cSld>
+  <p:clrMapOvr>
+    <a:masterClrMapping/>
+  </p:clrMapOvr>
+</p:sld>
+</file>
+
+<file path=ppt/slides/slide18.xml><?xml version="1.0" encoding="utf-8"?>
+<p:sld xmlns:a="http://schemas.openxmlformats.org/drawingml/2006/main" xmlns:r="http://schemas.openxmlformats.org/officeDocument/2006/relationships" xmlns:p="http://schemas.openxmlformats.org/presentationml/2006/main">
+  <p:cSld>
+    <p:spTree>
+      <p:nvGrpSpPr>
+        <p:cNvPr id="1" name=""/>
+        <p:cNvGrpSpPr/>
+        <p:nvPr/>
+      </p:nvGrpSpPr>
+      <p:grpSpPr>
+        <a:xfrm>
+          <a:off x="0" y="0"/>
+          <a:ext cx="0" cy="0"/>
+          <a:chOff x="0" y="0"/>
+          <a:chExt cx="0" cy="0"/>
+        </a:xfrm>
+      </p:grpSpPr>
+      <p:sp>
+        <p:nvSpPr>
+          <p:cNvPr id="2" name="Título 1"/>
+          <p:cNvSpPr>
+            <a:spLocks noGrp="1"/>
+          </p:cNvSpPr>
+          <p:nvPr>
+            <p:ph type="title"/>
+          </p:nvPr>
+        </p:nvSpPr>
+        <p:spPr/>
+        <p:txBody>
+          <a:bodyPr/>
+          <a:lstStyle/>
+          <a:p>
+            <a:r>
+              <a:rPr lang="pt-BR" dirty="0" smtClean="0"/>
+              <a:t>Analisador Sintático</a:t>
+            </a:r>
+            <a:endParaRPr lang="pt-BR" dirty="0"/>
+          </a:p>
+        </p:txBody>
+      </p:sp>
+      <p:sp>
+        <p:nvSpPr>
+          <p:cNvPr id="3" name="Espaço Reservado para Conteúdo 2"/>
+          <p:cNvSpPr>
+            <a:spLocks noGrp="1"/>
+          </p:cNvSpPr>
+          <p:nvPr>
+            <p:ph idx="1"/>
+          </p:nvPr>
+        </p:nvSpPr>
+        <p:spPr/>
+        <p:txBody>
+          <a:bodyPr/>
+          <a:lstStyle/>
+          <a:p>
+            <a:pPr marL="342900" lvl="1" indent="-342900">
+              <a:buFont typeface="Wingdings 2"/>
+              <a:buChar char=""/>
+            </a:pPr>
+            <a:r>
+              <a:rPr lang="pt-BR" dirty="0" smtClean="0"/>
+              <a:t>Caso </a:t>
+            </a:r>
+            <a:r>
+              <a:rPr lang="pt-BR" dirty="0" smtClean="0"/>
+              <a:t>toda a </a:t>
+            </a:r>
+            <a:r>
+              <a:rPr lang="pt-BR" dirty="0" err="1" smtClean="0"/>
+              <a:t>token_list</a:t>
+            </a:r>
+            <a:r>
+              <a:rPr lang="pt-BR" dirty="0" smtClean="0"/>
+              <a:t> </a:t>
+            </a:r>
+            <a:r>
+              <a:rPr lang="pt-BR" dirty="0" smtClean="0"/>
+              <a:t>passe ok, ele tem como saída o ponteiro </a:t>
+            </a:r>
+            <a:r>
+              <a:rPr lang="pt-BR" dirty="0" err="1" smtClean="0"/>
+              <a:t>il_out</a:t>
+            </a:r>
+            <a:r>
+              <a:rPr lang="pt-BR" dirty="0" smtClean="0"/>
+              <a:t>, </a:t>
+            </a:r>
+            <a:r>
+              <a:rPr lang="pt-BR" dirty="0" smtClean="0"/>
+              <a:t>que aponta para </a:t>
+            </a:r>
+            <a:r>
+              <a:rPr lang="pt-BR" smtClean="0"/>
+              <a:t>o início da lista de  </a:t>
+            </a:r>
+            <a:r>
+              <a:rPr lang="pt-BR" dirty="0" smtClean="0"/>
+              <a:t>entrada para o analisador semântico.</a:t>
+            </a:r>
+          </a:p>
+          <a:p>
+            <a:endParaRPr lang="pt-BR" dirty="0"/>
           </a:p>
         </p:txBody>
       </p:sp>

</xml_diff>